<commit_message>
Ammended error in Luce-Tukey plot
</commit_message>
<xml_diff>
--- a/plots/luce_tukey_plot.pptx
+++ b/plots/luce_tukey_plot.pptx
@@ -104,6 +104,11 @@
       </a:defRPr>
     </a:lvl9pPr>
   </p:defaultTextStyle>
+  <p:extLst>
+    <p:ext uri="{EFAFB233-063F-42B5-8137-9DF3F51BA10A}">
+      <p15:sldGuideLst xmlns:p15="http://schemas.microsoft.com/office/powerpoint/2012/main"/>
+    </p:ext>
+  </p:extLst>
 </p:presentation>
 </file>
 
@@ -256,7 +261,7 @@
           <a:p>
             <a:fld id="{01ABCEED-29CA-4BD8-99E8-78E49D7DB506}" type="datetimeFigureOut">
               <a:rPr lang="en-GB" smtClean="0"/>
-              <a:t>18/01/2023</a:t>
+              <a:t>15/02/2023</a:t>
             </a:fld>
             <a:endParaRPr lang="en-GB"/>
           </a:p>
@@ -456,7 +461,7 @@
           <a:p>
             <a:fld id="{01ABCEED-29CA-4BD8-99E8-78E49D7DB506}" type="datetimeFigureOut">
               <a:rPr lang="en-GB" smtClean="0"/>
-              <a:t>18/01/2023</a:t>
+              <a:t>15/02/2023</a:t>
             </a:fld>
             <a:endParaRPr lang="en-GB"/>
           </a:p>
@@ -666,7 +671,7 @@
           <a:p>
             <a:fld id="{01ABCEED-29CA-4BD8-99E8-78E49D7DB506}" type="datetimeFigureOut">
               <a:rPr lang="en-GB" smtClean="0"/>
-              <a:t>18/01/2023</a:t>
+              <a:t>15/02/2023</a:t>
             </a:fld>
             <a:endParaRPr lang="en-GB"/>
           </a:p>
@@ -866,7 +871,7 @@
           <a:p>
             <a:fld id="{01ABCEED-29CA-4BD8-99E8-78E49D7DB506}" type="datetimeFigureOut">
               <a:rPr lang="en-GB" smtClean="0"/>
-              <a:t>18/01/2023</a:t>
+              <a:t>15/02/2023</a:t>
             </a:fld>
             <a:endParaRPr lang="en-GB"/>
           </a:p>
@@ -1142,7 +1147,7 @@
           <a:p>
             <a:fld id="{01ABCEED-29CA-4BD8-99E8-78E49D7DB506}" type="datetimeFigureOut">
               <a:rPr lang="en-GB" smtClean="0"/>
-              <a:t>18/01/2023</a:t>
+              <a:t>15/02/2023</a:t>
             </a:fld>
             <a:endParaRPr lang="en-GB"/>
           </a:p>
@@ -1410,7 +1415,7 @@
           <a:p>
             <a:fld id="{01ABCEED-29CA-4BD8-99E8-78E49D7DB506}" type="datetimeFigureOut">
               <a:rPr lang="en-GB" smtClean="0"/>
-              <a:t>18/01/2023</a:t>
+              <a:t>15/02/2023</a:t>
             </a:fld>
             <a:endParaRPr lang="en-GB"/>
           </a:p>
@@ -1825,7 +1830,7 @@
           <a:p>
             <a:fld id="{01ABCEED-29CA-4BD8-99E8-78E49D7DB506}" type="datetimeFigureOut">
               <a:rPr lang="en-GB" smtClean="0"/>
-              <a:t>18/01/2023</a:t>
+              <a:t>15/02/2023</a:t>
             </a:fld>
             <a:endParaRPr lang="en-GB"/>
           </a:p>
@@ -1967,7 +1972,7 @@
           <a:p>
             <a:fld id="{01ABCEED-29CA-4BD8-99E8-78E49D7DB506}" type="datetimeFigureOut">
               <a:rPr lang="en-GB" smtClean="0"/>
-              <a:t>18/01/2023</a:t>
+              <a:t>15/02/2023</a:t>
             </a:fld>
             <a:endParaRPr lang="en-GB"/>
           </a:p>
@@ -2080,7 +2085,7 @@
           <a:p>
             <a:fld id="{01ABCEED-29CA-4BD8-99E8-78E49D7DB506}" type="datetimeFigureOut">
               <a:rPr lang="en-GB" smtClean="0"/>
-              <a:t>18/01/2023</a:t>
+              <a:t>15/02/2023</a:t>
             </a:fld>
             <a:endParaRPr lang="en-GB"/>
           </a:p>
@@ -2393,7 +2398,7 @@
           <a:p>
             <a:fld id="{01ABCEED-29CA-4BD8-99E8-78E49D7DB506}" type="datetimeFigureOut">
               <a:rPr lang="en-GB" smtClean="0"/>
-              <a:t>18/01/2023</a:t>
+              <a:t>15/02/2023</a:t>
             </a:fld>
             <a:endParaRPr lang="en-GB"/>
           </a:p>
@@ -2682,7 +2687,7 @@
           <a:p>
             <a:fld id="{01ABCEED-29CA-4BD8-99E8-78E49D7DB506}" type="datetimeFigureOut">
               <a:rPr lang="en-GB" smtClean="0"/>
-              <a:t>18/01/2023</a:t>
+              <a:t>15/02/2023</a:t>
             </a:fld>
             <a:endParaRPr lang="en-GB"/>
           </a:p>
@@ -2925,7 +2930,7 @@
           <a:p>
             <a:fld id="{01ABCEED-29CA-4BD8-99E8-78E49D7DB506}" type="datetimeFigureOut">
               <a:rPr lang="en-GB" smtClean="0"/>
-              <a:t>18/01/2023</a:t>
+              <a:t>15/02/2023</a:t>
             </a:fld>
             <a:endParaRPr lang="en-GB"/>
           </a:p>
@@ -3357,7 +3362,7 @@
           <p:nvPr>
             <p:extLst>
               <p:ext uri="{D42A27DB-BD31-4B8C-83A1-F6EECF244321}">
-                <p14:modId xmlns:p14="http://schemas.microsoft.com/office/powerpoint/2010/main" val="2052253661"/>
+                <p14:modId xmlns:p14="http://schemas.microsoft.com/office/powerpoint/2010/main" val="3158978632"/>
               </p:ext>
             </p:extLst>
           </p:nvPr>
@@ -4104,7 +4109,7 @@
                             <a:schemeClr val="tx1"/>
                           </a:solidFill>
                         </a:rPr>
-                        <a:t>1</a:t>
+                        <a:t>2</a:t>
                       </a:r>
                       <a:r>
                         <a:rPr lang="en-GB" sz="4800" b="0" baseline="0" dirty="0">
@@ -4189,7 +4194,7 @@
                             <a:schemeClr val="tx1"/>
                           </a:solidFill>
                         </a:rPr>
-                        <a:t>1</a:t>
+                        <a:t>2</a:t>
                       </a:r>
                       <a:r>
                         <a:rPr lang="en-GB" sz="4800" b="0" baseline="0" dirty="0">
@@ -4282,7 +4287,7 @@
                             <a:schemeClr val="tx1"/>
                           </a:solidFill>
                         </a:rPr>
-                        <a:t>1</a:t>
+                        <a:t>2</a:t>
                       </a:r>
                       <a:r>
                         <a:rPr lang="en-GB" sz="4800" b="0" baseline="0" dirty="0">
@@ -4451,7 +4456,7 @@
                             <a:schemeClr val="tx1"/>
                           </a:solidFill>
                         </a:rPr>
-                        <a:t>1</a:t>
+                        <a:t>3</a:t>
                       </a:r>
                       <a:r>
                         <a:rPr lang="en-GB" sz="4800" b="0" baseline="0" dirty="0">
@@ -4536,7 +4541,7 @@
                             <a:schemeClr val="tx1"/>
                           </a:solidFill>
                         </a:rPr>
-                        <a:t>1</a:t>
+                        <a:t>3</a:t>
                       </a:r>
                       <a:r>
                         <a:rPr lang="en-GB" sz="4800" b="0" baseline="0" dirty="0">
@@ -4616,7 +4621,7 @@
                     <a:p>
                       <a:pPr algn="ctr"/>
                       <a:r>
-                        <a:rPr lang="en-GB" sz="4800" b="0" baseline="0" dirty="0">
+                        <a:rPr lang="en-GB" sz="4800" b="0" baseline="0">
                           <a:solidFill>
                             <a:schemeClr val="tx1"/>
                           </a:solidFill>
@@ -4629,10 +4634,10 @@
                             <a:schemeClr val="tx1"/>
                           </a:solidFill>
                         </a:rPr>
-                        <a:t>1</a:t>
-                      </a:r>
-                      <a:r>
-                        <a:rPr lang="en-GB" sz="4800" b="0" baseline="0" dirty="0">
+                        <a:t>3</a:t>
+                      </a:r>
+                      <a:r>
+                        <a:rPr lang="en-GB" sz="4800" b="0" baseline="0">
                           <a:solidFill>
                             <a:schemeClr val="tx1"/>
                           </a:solidFill>

</xml_diff>